<commit_message>
further updates to figs
</commit_message>
<xml_diff>
--- a/Figures/Figure 1.pptx
+++ b/Figures/Figure 1.pptx
@@ -6,11 +6,12 @@
   </p:sldMasterIdLst>
   <p:sldIdLst>
     <p:sldId id="260" r:id="rId2"/>
-    <p:sldId id="259" r:id="rId3"/>
-    <p:sldId id="261" r:id="rId4"/>
-    <p:sldId id="262" r:id="rId5"/>
-    <p:sldId id="263" r:id="rId6"/>
-    <p:sldId id="264" r:id="rId7"/>
+    <p:sldId id="265" r:id="rId3"/>
+    <p:sldId id="259" r:id="rId4"/>
+    <p:sldId id="261" r:id="rId5"/>
+    <p:sldId id="262" r:id="rId6"/>
+    <p:sldId id="263" r:id="rId7"/>
+    <p:sldId id="264" r:id="rId8"/>
   </p:sldIdLst>
   <p:sldSz cx="12192000" cy="6858000"/>
   <p:notesSz cx="6858000" cy="9144000"/>
@@ -383,7 +384,7 @@
           <a:p>
             <a:fld id="{CAE04AF2-9FD4-4D07-8415-B4FEC9064C4B}" type="datetimeFigureOut">
               <a:rPr lang="es-ES" smtClean="0"/>
-              <a:t>15/9/25</a:t>
+              <a:t>18/9/25</a:t>
             </a:fld>
             <a:endParaRPr lang="es-ES"/>
           </a:p>
@@ -583,7 +584,7 @@
           <a:p>
             <a:fld id="{CAE04AF2-9FD4-4D07-8415-B4FEC9064C4B}" type="datetimeFigureOut">
               <a:rPr lang="es-ES" smtClean="0"/>
-              <a:t>15/9/25</a:t>
+              <a:t>18/9/25</a:t>
             </a:fld>
             <a:endParaRPr lang="es-ES"/>
           </a:p>
@@ -793,7 +794,7 @@
           <a:p>
             <a:fld id="{CAE04AF2-9FD4-4D07-8415-B4FEC9064C4B}" type="datetimeFigureOut">
               <a:rPr lang="es-ES" smtClean="0"/>
-              <a:t>15/9/25</a:t>
+              <a:t>18/9/25</a:t>
             </a:fld>
             <a:endParaRPr lang="es-ES"/>
           </a:p>
@@ -993,7 +994,7 @@
           <a:p>
             <a:fld id="{CAE04AF2-9FD4-4D07-8415-B4FEC9064C4B}" type="datetimeFigureOut">
               <a:rPr lang="es-ES" smtClean="0"/>
-              <a:t>15/9/25</a:t>
+              <a:t>18/9/25</a:t>
             </a:fld>
             <a:endParaRPr lang="es-ES"/>
           </a:p>
@@ -1269,7 +1270,7 @@
           <a:p>
             <a:fld id="{CAE04AF2-9FD4-4D07-8415-B4FEC9064C4B}" type="datetimeFigureOut">
               <a:rPr lang="es-ES" smtClean="0"/>
-              <a:t>15/9/25</a:t>
+              <a:t>18/9/25</a:t>
             </a:fld>
             <a:endParaRPr lang="es-ES"/>
           </a:p>
@@ -1537,7 +1538,7 @@
           <a:p>
             <a:fld id="{CAE04AF2-9FD4-4D07-8415-B4FEC9064C4B}" type="datetimeFigureOut">
               <a:rPr lang="es-ES" smtClean="0"/>
-              <a:t>15/9/25</a:t>
+              <a:t>18/9/25</a:t>
             </a:fld>
             <a:endParaRPr lang="es-ES"/>
           </a:p>
@@ -1952,7 +1953,7 @@
           <a:p>
             <a:fld id="{CAE04AF2-9FD4-4D07-8415-B4FEC9064C4B}" type="datetimeFigureOut">
               <a:rPr lang="es-ES" smtClean="0"/>
-              <a:t>15/9/25</a:t>
+              <a:t>18/9/25</a:t>
             </a:fld>
             <a:endParaRPr lang="es-ES"/>
           </a:p>
@@ -2094,7 +2095,7 @@
           <a:p>
             <a:fld id="{CAE04AF2-9FD4-4D07-8415-B4FEC9064C4B}" type="datetimeFigureOut">
               <a:rPr lang="es-ES" smtClean="0"/>
-              <a:t>15/9/25</a:t>
+              <a:t>18/9/25</a:t>
             </a:fld>
             <a:endParaRPr lang="es-ES"/>
           </a:p>
@@ -2207,7 +2208,7 @@
           <a:p>
             <a:fld id="{CAE04AF2-9FD4-4D07-8415-B4FEC9064C4B}" type="datetimeFigureOut">
               <a:rPr lang="es-ES" smtClean="0"/>
-              <a:t>15/9/25</a:t>
+              <a:t>18/9/25</a:t>
             </a:fld>
             <a:endParaRPr lang="es-ES"/>
           </a:p>
@@ -2520,7 +2521,7 @@
           <a:p>
             <a:fld id="{CAE04AF2-9FD4-4D07-8415-B4FEC9064C4B}" type="datetimeFigureOut">
               <a:rPr lang="es-ES" smtClean="0"/>
-              <a:t>15/9/25</a:t>
+              <a:t>18/9/25</a:t>
             </a:fld>
             <a:endParaRPr lang="es-ES"/>
           </a:p>
@@ -2809,7 +2810,7 @@
           <a:p>
             <a:fld id="{CAE04AF2-9FD4-4D07-8415-B4FEC9064C4B}" type="datetimeFigureOut">
               <a:rPr lang="es-ES" smtClean="0"/>
-              <a:t>15/9/25</a:t>
+              <a:t>18/9/25</a:t>
             </a:fld>
             <a:endParaRPr lang="es-ES"/>
           </a:p>
@@ -3052,7 +3053,7 @@
           <a:p>
             <a:fld id="{CAE04AF2-9FD4-4D07-8415-B4FEC9064C4B}" type="datetimeFigureOut">
               <a:rPr lang="es-ES" smtClean="0"/>
-              <a:t>15/9/25</a:t>
+              <a:t>18/9/25</a:t>
             </a:fld>
             <a:endParaRPr lang="es-ES"/>
           </a:p>
@@ -3807,7 +3808,7 @@
           <p:nvPr>
             <p:extLst>
               <p:ext uri="{D42A27DB-BD31-4B8C-83A1-F6EECF244321}">
-                <p14:modId xmlns:p14="http://schemas.microsoft.com/office/powerpoint/2010/main" val="1794311366"/>
+                <p14:modId xmlns:p14="http://schemas.microsoft.com/office/powerpoint/2010/main" val="3469758739"/>
               </p:ext>
             </p:extLst>
           </p:nvPr>
@@ -3917,7 +3918,7 @@
                           <a:ea typeface="Helvetica Neue" panose="02000503000000020004" pitchFamily="2" charset="0"/>
                           <a:cs typeface="Helvetica Neue" panose="02000503000000020004" pitchFamily="2" charset="0"/>
                         </a:rPr>
-                        <a:t> FORBIDDEN</a:t>
+                        <a:t>         FORBIDDEN</a:t>
                       </a:r>
                     </a:p>
                   </a:txBody>
@@ -4012,7 +4013,7 @@
                           <a:ea typeface="Helvetica Neue" panose="02000503000000020004" pitchFamily="2" charset="0"/>
                           <a:cs typeface="Helvetica Neue" panose="02000503000000020004" pitchFamily="2" charset="0"/>
                         </a:rPr>
-                        <a:t>ALLOWED</a:t>
+                        <a:t>       ALLOWED</a:t>
                       </a:r>
                     </a:p>
                   </a:txBody>
@@ -4068,7 +4069,7 @@
                           <a:ea typeface="Helvetica Neue" panose="02000503000000020004" pitchFamily="2" charset="0"/>
                           <a:cs typeface="Helvetica Neue" panose="02000503000000020004" pitchFamily="2" charset="0"/>
                         </a:rPr>
-                        <a:t>  Purposivist verdict:</a:t>
+                        <a:t>  Intentionalist verdict:</a:t>
                       </a:r>
                     </a:p>
                   </a:txBody>
@@ -4123,7 +4124,7 @@
                           <a:ea typeface="Helvetica Neue" panose="02000503000000020004" pitchFamily="2" charset="0"/>
                           <a:cs typeface="Helvetica Neue" panose="02000503000000020004" pitchFamily="2" charset="0"/>
                         </a:rPr>
-                        <a:t>ALLOWED</a:t>
+                        <a:t>     ALLOWED</a:t>
                       </a:r>
                     </a:p>
                   </a:txBody>
@@ -4230,7 +4231,7 @@
                           <a:ea typeface="Helvetica Neue" panose="02000503000000020004" pitchFamily="2" charset="0"/>
                           <a:cs typeface="Helvetica Neue" panose="02000503000000020004" pitchFamily="2" charset="0"/>
                         </a:rPr>
-                        <a:t>FORBIDDEN</a:t>
+                        <a:t>           FORBIDDEN</a:t>
                       </a:r>
                     </a:p>
                   </a:txBody>
@@ -4581,6 +4582,150 @@
           </a:graphicData>
         </a:graphic>
       </p:graphicFrame>
+      <p:pic>
+        <p:nvPicPr>
+          <p:cNvPr id="3" name="Graphic 2" descr="Badge Tick1 with solid fill">
+            <a:extLst>
+              <a:ext uri="{FF2B5EF4-FFF2-40B4-BE49-F238E27FC236}">
+                <a16:creationId xmlns:a16="http://schemas.microsoft.com/office/drawing/2014/main" id="{B4C5807A-BF81-8019-6AB3-D3CA803E6090}"/>
+              </a:ext>
+            </a:extLst>
+          </p:cNvPr>
+          <p:cNvPicPr>
+            <a:picLocks noChangeAspect="1"/>
+          </p:cNvPicPr>
+          <p:nvPr/>
+        </p:nvPicPr>
+        <p:blipFill>
+          <a:blip r:embed="rId4">
+            <a:extLst>
+              <a:ext uri="{96DAC541-7B7A-43D3-8B79-37D633B846F1}">
+                <asvg:svgBlip xmlns:asvg="http://schemas.microsoft.com/office/drawing/2016/SVG/main" r:embed="rId5"/>
+              </a:ext>
+            </a:extLst>
+          </a:blip>
+          <a:stretch>
+            <a:fillRect/>
+          </a:stretch>
+        </p:blipFill>
+        <p:spPr>
+          <a:xfrm>
+            <a:off x="4829937" y="5624615"/>
+            <a:ext cx="432000" cy="432000"/>
+          </a:xfrm>
+          <a:prstGeom prst="rect">
+            <a:avLst/>
+          </a:prstGeom>
+        </p:spPr>
+      </p:pic>
+      <p:pic>
+        <p:nvPicPr>
+          <p:cNvPr id="13" name="Graphic 12" descr="Badge Tick1 with solid fill">
+            <a:extLst>
+              <a:ext uri="{FF2B5EF4-FFF2-40B4-BE49-F238E27FC236}">
+                <a16:creationId xmlns:a16="http://schemas.microsoft.com/office/drawing/2014/main" id="{DE0BFA27-CDD0-BE22-D7E9-389CA1B9AA86}"/>
+              </a:ext>
+            </a:extLst>
+          </p:cNvPr>
+          <p:cNvPicPr>
+            <a:picLocks noChangeAspect="1"/>
+          </p:cNvPicPr>
+          <p:nvPr/>
+        </p:nvPicPr>
+        <p:blipFill>
+          <a:blip r:embed="rId4">
+            <a:extLst>
+              <a:ext uri="{96DAC541-7B7A-43D3-8B79-37D633B846F1}">
+                <asvg:svgBlip xmlns:asvg="http://schemas.microsoft.com/office/drawing/2016/SVG/main" r:embed="rId5"/>
+              </a:ext>
+            </a:extLst>
+          </a:blip>
+          <a:stretch>
+            <a:fillRect/>
+          </a:stretch>
+        </p:blipFill>
+        <p:spPr>
+          <a:xfrm>
+            <a:off x="8909645" y="5072165"/>
+            <a:ext cx="432000" cy="432000"/>
+          </a:xfrm>
+          <a:prstGeom prst="rect">
+            <a:avLst/>
+          </a:prstGeom>
+        </p:spPr>
+      </p:pic>
+      <p:pic>
+        <p:nvPicPr>
+          <p:cNvPr id="16" name="Graphic 15" descr="Badge Cross with solid fill">
+            <a:extLst>
+              <a:ext uri="{FF2B5EF4-FFF2-40B4-BE49-F238E27FC236}">
+                <a16:creationId xmlns:a16="http://schemas.microsoft.com/office/drawing/2014/main" id="{BA83C9C4-1899-011A-FAC5-EC10C54A7FE1}"/>
+              </a:ext>
+            </a:extLst>
+          </p:cNvPr>
+          <p:cNvPicPr>
+            <a:picLocks noChangeAspect="1"/>
+          </p:cNvPicPr>
+          <p:nvPr/>
+        </p:nvPicPr>
+        <p:blipFill>
+          <a:blip r:embed="rId6">
+            <a:extLst>
+              <a:ext uri="{96DAC541-7B7A-43D3-8B79-37D633B846F1}">
+                <asvg:svgBlip xmlns:asvg="http://schemas.microsoft.com/office/drawing/2016/SVG/main" r:embed="rId7"/>
+              </a:ext>
+            </a:extLst>
+          </a:blip>
+          <a:stretch>
+            <a:fillRect/>
+          </a:stretch>
+        </p:blipFill>
+        <p:spPr>
+          <a:xfrm>
+            <a:off x="4817337" y="5104019"/>
+            <a:ext cx="450000" cy="450000"/>
+          </a:xfrm>
+          <a:prstGeom prst="rect">
+            <a:avLst/>
+          </a:prstGeom>
+        </p:spPr>
+      </p:pic>
+      <p:pic>
+        <p:nvPicPr>
+          <p:cNvPr id="17" name="Graphic 16" descr="Badge Cross with solid fill">
+            <a:extLst>
+              <a:ext uri="{FF2B5EF4-FFF2-40B4-BE49-F238E27FC236}">
+                <a16:creationId xmlns:a16="http://schemas.microsoft.com/office/drawing/2014/main" id="{F69B66BA-5997-DB5F-1365-7000FA776E10}"/>
+              </a:ext>
+            </a:extLst>
+          </p:cNvPr>
+          <p:cNvPicPr>
+            <a:picLocks noChangeAspect="1"/>
+          </p:cNvPicPr>
+          <p:nvPr/>
+        </p:nvPicPr>
+        <p:blipFill>
+          <a:blip r:embed="rId6">
+            <a:extLst>
+              <a:ext uri="{96DAC541-7B7A-43D3-8B79-37D633B846F1}">
+                <asvg:svgBlip xmlns:asvg="http://schemas.microsoft.com/office/drawing/2016/SVG/main" r:embed="rId7"/>
+              </a:ext>
+            </a:extLst>
+          </a:blip>
+          <a:stretch>
+            <a:fillRect/>
+          </a:stretch>
+        </p:blipFill>
+        <p:spPr>
+          <a:xfrm>
+            <a:off x="8909645" y="5615615"/>
+            <a:ext cx="450000" cy="450000"/>
+          </a:xfrm>
+          <a:prstGeom prst="rect">
+            <a:avLst/>
+          </a:prstGeom>
+        </p:spPr>
+      </p:pic>
     </p:spTree>
     <p:extLst>
       <p:ext uri="{BB962C8B-B14F-4D97-AF65-F5344CB8AC3E}">
@@ -4599,7 +4744,13 @@
   <p:cSld>
     <p:spTree>
       <p:nvGrpSpPr>
-        <p:cNvPr id="1" name=""/>
+        <p:cNvPr id="1" name="">
+          <a:extLst>
+            <a:ext uri="{FF2B5EF4-FFF2-40B4-BE49-F238E27FC236}">
+              <a16:creationId xmlns:a16="http://schemas.microsoft.com/office/drawing/2014/main" id="{FEA6EE76-296E-8A17-2E3B-69919DAA33F7}"/>
+            </a:ext>
+          </a:extLst>
+        </p:cNvPr>
         <p:cNvGrpSpPr/>
         <p:nvPr/>
       </p:nvGrpSpPr>
@@ -4613,10 +4764,10 @@
       </p:grpSpPr>
       <p:pic>
         <p:nvPicPr>
-          <p:cNvPr id="40" name="Picture 39">
-            <a:extLst>
-              <a:ext uri="{FF2B5EF4-FFF2-40B4-BE49-F238E27FC236}">
-                <a16:creationId xmlns:a16="http://schemas.microsoft.com/office/drawing/2014/main" id="{310F60B9-BA43-FCF0-1F34-46240DA450DB}"/>
+          <p:cNvPr id="30" name="Picture 29">
+            <a:extLst>
+              <a:ext uri="{FF2B5EF4-FFF2-40B4-BE49-F238E27FC236}">
+                <a16:creationId xmlns:a16="http://schemas.microsoft.com/office/drawing/2014/main" id="{45C5714B-170E-4FA6-B850-39E28AA6662D}"/>
               </a:ext>
             </a:extLst>
           </p:cNvPr>
@@ -4644,7 +4795,7 @@
     </p:spTree>
     <p:extLst>
       <p:ext uri="{BB962C8B-B14F-4D97-AF65-F5344CB8AC3E}">
-        <p14:creationId xmlns:p14="http://schemas.microsoft.com/office/powerpoint/2010/main" val="438197373"/>
+        <p14:creationId xmlns:p14="http://schemas.microsoft.com/office/powerpoint/2010/main" val="2574723974"/>
       </p:ext>
     </p:extLst>
   </p:cSld>
@@ -4671,6 +4822,66 @@
           <a:chExt cx="0" cy="0"/>
         </a:xfrm>
       </p:grpSpPr>
+      <p:pic>
+        <p:nvPicPr>
+          <p:cNvPr id="12" name="Picture 11">
+            <a:extLst>
+              <a:ext uri="{FF2B5EF4-FFF2-40B4-BE49-F238E27FC236}">
+                <a16:creationId xmlns:a16="http://schemas.microsoft.com/office/drawing/2014/main" id="{56254BCD-4617-FD43-667B-F4B8DCA414B1}"/>
+              </a:ext>
+            </a:extLst>
+          </p:cNvPr>
+          <p:cNvPicPr>
+            <a:picLocks noChangeAspect="1"/>
+          </p:cNvPicPr>
+          <p:nvPr/>
+        </p:nvPicPr>
+        <p:blipFill>
+          <a:blip r:embed="rId2"/>
+          <a:stretch>
+            <a:fillRect/>
+          </a:stretch>
+        </p:blipFill>
+        <p:spPr>
+          <a:xfrm>
+            <a:off x="2209800" y="1461803"/>
+            <a:ext cx="7772400" cy="3934394"/>
+          </a:xfrm>
+          <a:prstGeom prst="rect">
+            <a:avLst/>
+          </a:prstGeom>
+        </p:spPr>
+      </p:pic>
+    </p:spTree>
+    <p:extLst>
+      <p:ext uri="{BB962C8B-B14F-4D97-AF65-F5344CB8AC3E}">
+        <p14:creationId xmlns:p14="http://schemas.microsoft.com/office/powerpoint/2010/main" val="438197373"/>
+      </p:ext>
+    </p:extLst>
+  </p:cSld>
+  <p:clrMapOvr>
+    <a:masterClrMapping/>
+  </p:clrMapOvr>
+</p:sld>
+</file>
+
+<file path=ppt/slides/slide4.xml><?xml version="1.0" encoding="utf-8"?>
+<p:sld xmlns:a="http://schemas.openxmlformats.org/drawingml/2006/main" xmlns:r="http://schemas.openxmlformats.org/officeDocument/2006/relationships" xmlns:p="http://schemas.openxmlformats.org/presentationml/2006/main">
+  <p:cSld>
+    <p:spTree>
+      <p:nvGrpSpPr>
+        <p:cNvPr id="1" name=""/>
+        <p:cNvGrpSpPr/>
+        <p:nvPr/>
+      </p:nvGrpSpPr>
+      <p:grpSpPr>
+        <a:xfrm>
+          <a:off x="0" y="0"/>
+          <a:ext cx="0" cy="0"/>
+          <a:chOff x="0" y="0"/>
+          <a:chExt cx="0" cy="0"/>
+        </a:xfrm>
+      </p:grpSpPr>
       <p:sp>
         <p:nvSpPr>
           <p:cNvPr id="4" name="Rectangle 3">
@@ -7163,7 +7374,7 @@
 </p:sld>
 </file>
 
-<file path=ppt/slides/slide4.xml><?xml version="1.0" encoding="utf-8"?>
+<file path=ppt/slides/slide5.xml><?xml version="1.0" encoding="utf-8"?>
 <p:sld xmlns:a="http://schemas.openxmlformats.org/drawingml/2006/main" xmlns:r="http://schemas.openxmlformats.org/officeDocument/2006/relationships" xmlns:p="http://schemas.openxmlformats.org/presentationml/2006/main">
   <p:cSld>
     <p:spTree>
@@ -7625,102 +7836,6 @@
       </p:sp>
       <p:sp>
         <p:nvSpPr>
-          <p:cNvPr id="93" name="Rectangle: Rounded Corners 51">
-            <a:extLst>
-              <a:ext uri="{FF2B5EF4-FFF2-40B4-BE49-F238E27FC236}">
-                <a16:creationId xmlns:a16="http://schemas.microsoft.com/office/drawing/2014/main" id="{AC0C10F2-5EE1-01EF-E98E-3028B386E83D}"/>
-              </a:ext>
-            </a:extLst>
-          </p:cNvPr>
-          <p:cNvSpPr/>
-          <p:nvPr/>
-        </p:nvSpPr>
-        <p:spPr>
-          <a:xfrm>
-            <a:off x="11739544" y="4408030"/>
-            <a:ext cx="282758" cy="175673"/>
-          </a:xfrm>
-          <a:prstGeom prst="roundRect">
-            <a:avLst/>
-          </a:prstGeom>
-          <a:solidFill>
-            <a:schemeClr val="bg1">
-              <a:lumMod val="75000"/>
-            </a:schemeClr>
-          </a:solidFill>
-          <a:ln>
-            <a:noFill/>
-          </a:ln>
-        </p:spPr>
-        <p:style>
-          <a:lnRef idx="3">
-            <a:schemeClr val="lt1"/>
-          </a:lnRef>
-          <a:fillRef idx="1">
-            <a:schemeClr val="accent4"/>
-          </a:fillRef>
-          <a:effectRef idx="1">
-            <a:schemeClr val="accent4"/>
-          </a:effectRef>
-          <a:fontRef idx="minor">
-            <a:schemeClr val="lt1"/>
-          </a:fontRef>
-        </p:style>
-        <p:txBody>
-          <a:bodyPr rtlCol="0" anchor="ctr"/>
-          <a:lstStyle/>
-          <a:p>
-            <a:pPr algn="ctr"/>
-            <a:endParaRPr lang="es-ES"/>
-          </a:p>
-        </p:txBody>
-      </p:sp>
-      <p:cxnSp>
-        <p:nvCxnSpPr>
-          <p:cNvPr id="94" name="Straight Arrow Connector 93">
-            <a:extLst>
-              <a:ext uri="{FF2B5EF4-FFF2-40B4-BE49-F238E27FC236}">
-                <a16:creationId xmlns:a16="http://schemas.microsoft.com/office/drawing/2014/main" id="{4B8590D0-C9BD-D360-16F2-1B4F9D6D873E}"/>
-              </a:ext>
-            </a:extLst>
-          </p:cNvPr>
-          <p:cNvCxnSpPr>
-            <a:cxnSpLocks/>
-          </p:cNvCxnSpPr>
-          <p:nvPr/>
-        </p:nvCxnSpPr>
-        <p:spPr>
-          <a:xfrm>
-            <a:off x="11799283" y="4486916"/>
-            <a:ext cx="163280" cy="0"/>
-          </a:xfrm>
-          <a:prstGeom prst="straightConnector1">
-            <a:avLst/>
-          </a:prstGeom>
-          <a:ln>
-            <a:solidFill>
-              <a:schemeClr val="bg1"/>
-            </a:solidFill>
-            <a:tailEnd type="triangle"/>
-          </a:ln>
-        </p:spPr>
-        <p:style>
-          <a:lnRef idx="2">
-            <a:schemeClr val="accent1"/>
-          </a:lnRef>
-          <a:fillRef idx="0">
-            <a:schemeClr val="accent1"/>
-          </a:fillRef>
-          <a:effectRef idx="1">
-            <a:schemeClr val="accent1"/>
-          </a:effectRef>
-          <a:fontRef idx="minor">
-            <a:schemeClr val="tx1"/>
-          </a:fontRef>
-        </p:style>
-      </p:cxnSp>
-      <p:sp>
-        <p:nvSpPr>
           <p:cNvPr id="95" name="TextBox 94">
             <a:extLst>
               <a:ext uri="{FF2B5EF4-FFF2-40B4-BE49-F238E27FC236}">
@@ -8550,7 +8665,7 @@
         </p:nvSpPr>
         <p:spPr>
           <a:xfrm>
-            <a:off x="7214557" y="3361086"/>
+            <a:off x="7209477" y="3350926"/>
             <a:ext cx="282758" cy="175673"/>
           </a:xfrm>
           <a:prstGeom prst="roundRect">
@@ -8561,6 +8676,7 @@
               <a:lumMod val="75000"/>
             </a:schemeClr>
           </a:solidFill>
+          <a:ln w="9525"/>
         </p:spPr>
         <p:style>
           <a:lnRef idx="3">
@@ -9006,7 +9122,7 @@
         </p:nvCxnSpPr>
         <p:spPr>
           <a:xfrm>
-            <a:off x="7694842" y="4486916"/>
+            <a:off x="7699922" y="4497076"/>
             <a:ext cx="163280" cy="0"/>
           </a:xfrm>
           <a:prstGeom prst="straightConnector1">
@@ -9217,145 +9333,6 @@
       </p:sp>
       <p:sp>
         <p:nvSpPr>
-          <p:cNvPr id="97" name="TextBox 96">
-            <a:extLst>
-              <a:ext uri="{FF2B5EF4-FFF2-40B4-BE49-F238E27FC236}">
-                <a16:creationId xmlns:a16="http://schemas.microsoft.com/office/drawing/2014/main" id="{510C2ED9-31B9-00C4-ED67-BB8CD1C48EF8}"/>
-              </a:ext>
-            </a:extLst>
-          </p:cNvPr>
-          <p:cNvSpPr txBox="1"/>
-          <p:nvPr/>
-        </p:nvSpPr>
-        <p:spPr>
-          <a:xfrm>
-            <a:off x="372140" y="2036916"/>
-            <a:ext cx="3270116" cy="369332"/>
-          </a:xfrm>
-          <a:prstGeom prst="rect">
-            <a:avLst/>
-          </a:prstGeom>
-          <a:noFill/>
-        </p:spPr>
-        <p:txBody>
-          <a:bodyPr wrap="square">
-            <a:spAutoFit/>
-          </a:bodyPr>
-          <a:lstStyle/>
-          <a:p>
-            <a:r>
-              <a:rPr lang="en-US" sz="1800" b="1" noProof="0" dirty="0">
-                <a:solidFill>
-                  <a:schemeClr val="tx1"/>
-                </a:solidFill>
-                <a:latin typeface="Helvetica Neue" panose="02000503000000020004" pitchFamily="2" charset="0"/>
-                <a:ea typeface="Helvetica Neue" panose="02000503000000020004" pitchFamily="2" charset="0"/>
-                <a:cs typeface="Helvetica Neue" panose="02000503000000020004" pitchFamily="2" charset="0"/>
-              </a:rPr>
-              <a:t>1. Rule presentation</a:t>
-            </a:r>
-            <a:endParaRPr lang="en-ES" dirty="0"/>
-          </a:p>
-        </p:txBody>
-      </p:sp>
-      <p:sp>
-        <p:nvSpPr>
-          <p:cNvPr id="98" name="TextBox 97">
-            <a:extLst>
-              <a:ext uri="{FF2B5EF4-FFF2-40B4-BE49-F238E27FC236}">
-                <a16:creationId xmlns:a16="http://schemas.microsoft.com/office/drawing/2014/main" id="{80C76E54-6864-4D59-5309-A5BCA4C1037B}"/>
-              </a:ext>
-            </a:extLst>
-          </p:cNvPr>
-          <p:cNvSpPr txBox="1"/>
-          <p:nvPr/>
-        </p:nvSpPr>
-        <p:spPr>
-          <a:xfrm>
-            <a:off x="4042486" y="1600200"/>
-            <a:ext cx="3905041" cy="369332"/>
-          </a:xfrm>
-          <a:prstGeom prst="rect">
-            <a:avLst/>
-          </a:prstGeom>
-          <a:noFill/>
-        </p:spPr>
-        <p:txBody>
-          <a:bodyPr wrap="square">
-            <a:spAutoFit/>
-          </a:bodyPr>
-          <a:lstStyle/>
-          <a:p>
-            <a:pPr algn="ctr"/>
-            <a:r>
-              <a:rPr lang="en-US" b="1" dirty="0">
-                <a:latin typeface="Helvetica Neue" panose="02000503000000020004" pitchFamily="2" charset="0"/>
-                <a:ea typeface="Helvetica Neue" panose="02000503000000020004" pitchFamily="2" charset="0"/>
-                <a:cs typeface="Helvetica Neue" panose="02000503000000020004" pitchFamily="2" charset="0"/>
-              </a:rPr>
-              <a:t>2</a:t>
-            </a:r>
-            <a:r>
-              <a:rPr lang="en-US" sz="1800" b="1" noProof="0" dirty="0">
-                <a:solidFill>
-                  <a:schemeClr val="tx1"/>
-                </a:solidFill>
-                <a:latin typeface="Helvetica Neue" panose="02000503000000020004" pitchFamily="2" charset="0"/>
-                <a:ea typeface="Helvetica Neue" panose="02000503000000020004" pitchFamily="2" charset="0"/>
-                <a:cs typeface="Helvetica Neue" panose="02000503000000020004" pitchFamily="2" charset="0"/>
-              </a:rPr>
-              <a:t>. Control cases</a:t>
-            </a:r>
-            <a:endParaRPr lang="en-ES" dirty="0"/>
-          </a:p>
-        </p:txBody>
-      </p:sp>
-      <p:sp>
-        <p:nvSpPr>
-          <p:cNvPr id="99" name="TextBox 98">
-            <a:extLst>
-              <a:ext uri="{FF2B5EF4-FFF2-40B4-BE49-F238E27FC236}">
-                <a16:creationId xmlns:a16="http://schemas.microsoft.com/office/drawing/2014/main" id="{A8CDA85C-59C4-FC10-6677-1A91B329251F}"/>
-              </a:ext>
-            </a:extLst>
-          </p:cNvPr>
-          <p:cNvSpPr txBox="1"/>
-          <p:nvPr/>
-        </p:nvSpPr>
-        <p:spPr>
-          <a:xfrm>
-            <a:off x="8224499" y="1616149"/>
-            <a:ext cx="3827470" cy="369332"/>
-          </a:xfrm>
-          <a:prstGeom prst="rect">
-            <a:avLst/>
-          </a:prstGeom>
-          <a:noFill/>
-        </p:spPr>
-        <p:txBody>
-          <a:bodyPr wrap="square">
-            <a:spAutoFit/>
-          </a:bodyPr>
-          <a:lstStyle/>
-          <a:p>
-            <a:pPr algn="ctr"/>
-            <a:r>
-              <a:rPr lang="en-US" sz="1800" b="1" noProof="0" dirty="0">
-                <a:solidFill>
-                  <a:schemeClr val="tx1"/>
-                </a:solidFill>
-                <a:latin typeface="Helvetica Neue" panose="02000503000000020004" pitchFamily="2" charset="0"/>
-                <a:ea typeface="Helvetica Neue" panose="02000503000000020004" pitchFamily="2" charset="0"/>
-                <a:cs typeface="Helvetica Neue" panose="02000503000000020004" pitchFamily="2" charset="0"/>
-              </a:rPr>
-              <a:t>3. Conflict cases</a:t>
-            </a:r>
-            <a:endParaRPr lang="en-ES" dirty="0"/>
-          </a:p>
-        </p:txBody>
-      </p:sp>
-      <p:sp>
-        <p:nvSpPr>
           <p:cNvPr id="11" name="Rectangle 10">
             <a:extLst>
               <a:ext uri="{FF2B5EF4-FFF2-40B4-BE49-F238E27FC236}">
@@ -9662,7 +9639,7 @@
         </p:nvSpPr>
         <p:spPr>
           <a:xfrm>
-            <a:off x="11396569" y="3361086"/>
+            <a:off x="11384886" y="3347621"/>
             <a:ext cx="282758" cy="175673"/>
           </a:xfrm>
           <a:prstGeom prst="roundRect">
@@ -9673,6 +9650,13 @@
               <a:lumMod val="75000"/>
             </a:schemeClr>
           </a:solidFill>
+          <a:ln w="9525">
+            <a:solidFill>
+              <a:schemeClr val="bg1">
+                <a:lumMod val="95000"/>
+              </a:schemeClr>
+            </a:solidFill>
+          </a:ln>
         </p:spPr>
         <p:style>
           <a:lnRef idx="3">
@@ -9713,7 +9697,7 @@
         </p:nvCxnSpPr>
         <p:spPr>
           <a:xfrm>
-            <a:off x="11456308" y="3439972"/>
+            <a:off x="11449705" y="3436667"/>
             <a:ext cx="163280" cy="0"/>
           </a:xfrm>
           <a:prstGeom prst="straightConnector1">
@@ -9777,6 +9761,106 @@
           </a:p>
         </p:txBody>
       </p:sp>
+      <p:sp>
+        <p:nvSpPr>
+          <p:cNvPr id="12" name="Rectangle: Rounded Corners 51">
+            <a:extLst>
+              <a:ext uri="{FF2B5EF4-FFF2-40B4-BE49-F238E27FC236}">
+                <a16:creationId xmlns:a16="http://schemas.microsoft.com/office/drawing/2014/main" id="{041DCDDE-566E-469A-EDCF-629BF4C1A969}"/>
+              </a:ext>
+            </a:extLst>
+          </p:cNvPr>
+          <p:cNvSpPr/>
+          <p:nvPr/>
+        </p:nvSpPr>
+        <p:spPr>
+          <a:xfrm>
+            <a:off x="11719154" y="4408030"/>
+            <a:ext cx="282758" cy="175673"/>
+          </a:xfrm>
+          <a:prstGeom prst="roundRect">
+            <a:avLst/>
+          </a:prstGeom>
+          <a:solidFill>
+            <a:schemeClr val="bg1">
+              <a:lumMod val="75000"/>
+            </a:schemeClr>
+          </a:solidFill>
+          <a:ln w="9525">
+            <a:solidFill>
+              <a:schemeClr val="bg1">
+                <a:lumMod val="95000"/>
+              </a:schemeClr>
+            </a:solidFill>
+          </a:ln>
+        </p:spPr>
+        <p:style>
+          <a:lnRef idx="3">
+            <a:schemeClr val="lt1"/>
+          </a:lnRef>
+          <a:fillRef idx="1">
+            <a:schemeClr val="accent4"/>
+          </a:fillRef>
+          <a:effectRef idx="1">
+            <a:schemeClr val="accent4"/>
+          </a:effectRef>
+          <a:fontRef idx="minor">
+            <a:schemeClr val="lt1"/>
+          </a:fontRef>
+        </p:style>
+        <p:txBody>
+          <a:bodyPr rtlCol="0" anchor="ctr"/>
+          <a:lstStyle/>
+          <a:p>
+            <a:pPr algn="ctr"/>
+            <a:endParaRPr lang="es-ES"/>
+          </a:p>
+        </p:txBody>
+      </p:sp>
+      <p:cxnSp>
+        <p:nvCxnSpPr>
+          <p:cNvPr id="94" name="Straight Arrow Connector 93">
+            <a:extLst>
+              <a:ext uri="{FF2B5EF4-FFF2-40B4-BE49-F238E27FC236}">
+                <a16:creationId xmlns:a16="http://schemas.microsoft.com/office/drawing/2014/main" id="{4B8590D0-C9BD-D360-16F2-1B4F9D6D873E}"/>
+              </a:ext>
+            </a:extLst>
+          </p:cNvPr>
+          <p:cNvCxnSpPr>
+            <a:cxnSpLocks/>
+          </p:cNvCxnSpPr>
+          <p:nvPr/>
+        </p:nvCxnSpPr>
+        <p:spPr>
+          <a:xfrm>
+            <a:off x="11783973" y="4494586"/>
+            <a:ext cx="163280" cy="0"/>
+          </a:xfrm>
+          <a:prstGeom prst="straightConnector1">
+            <a:avLst/>
+          </a:prstGeom>
+          <a:ln>
+            <a:solidFill>
+              <a:schemeClr val="bg1"/>
+            </a:solidFill>
+            <a:tailEnd type="triangle"/>
+          </a:ln>
+        </p:spPr>
+        <p:style>
+          <a:lnRef idx="2">
+            <a:schemeClr val="accent1"/>
+          </a:lnRef>
+          <a:fillRef idx="0">
+            <a:schemeClr val="accent1"/>
+          </a:fillRef>
+          <a:effectRef idx="1">
+            <a:schemeClr val="accent1"/>
+          </a:effectRef>
+          <a:fontRef idx="minor">
+            <a:schemeClr val="tx1"/>
+          </a:fontRef>
+        </p:style>
+      </p:cxnSp>
     </p:spTree>
     <p:extLst>
       <p:ext uri="{BB962C8B-B14F-4D97-AF65-F5344CB8AC3E}">
@@ -9790,7 +9874,7 @@
 </p:sld>
 </file>
 
-<file path=ppt/slides/slide5.xml><?xml version="1.0" encoding="utf-8"?>
+<file path=ppt/slides/slide6.xml><?xml version="1.0" encoding="utf-8"?>
 <p:sld xmlns:a="http://schemas.openxmlformats.org/drawingml/2006/main" xmlns:r="http://schemas.openxmlformats.org/officeDocument/2006/relationships" xmlns:p="http://schemas.openxmlformats.org/presentationml/2006/main">
   <p:cSld>
     <p:spTree>
@@ -10280,66 +10364,6 @@
           </a:prstGeom>
         </p:spPr>
       </p:pic>
-      <p:pic>
-        <p:nvPicPr>
-          <p:cNvPr id="31" name="Picture 30">
-            <a:extLst>
-              <a:ext uri="{FF2B5EF4-FFF2-40B4-BE49-F238E27FC236}">
-                <a16:creationId xmlns:a16="http://schemas.microsoft.com/office/drawing/2014/main" id="{B058C20D-4604-9577-A7CE-2E7327355E1B}"/>
-              </a:ext>
-            </a:extLst>
-          </p:cNvPr>
-          <p:cNvPicPr>
-            <a:picLocks noChangeAspect="1"/>
-          </p:cNvPicPr>
-          <p:nvPr/>
-        </p:nvPicPr>
-        <p:blipFill>
-          <a:blip r:embed="rId3"/>
-          <a:stretch>
-            <a:fillRect/>
-          </a:stretch>
-        </p:blipFill>
-        <p:spPr>
-          <a:xfrm>
-            <a:off x="4266702" y="2023962"/>
-            <a:ext cx="3600000" cy="2396142"/>
-          </a:xfrm>
-          <a:prstGeom prst="rect">
-            <a:avLst/>
-          </a:prstGeom>
-        </p:spPr>
-      </p:pic>
-      <p:pic>
-        <p:nvPicPr>
-          <p:cNvPr id="54" name="Picture 53">
-            <a:extLst>
-              <a:ext uri="{FF2B5EF4-FFF2-40B4-BE49-F238E27FC236}">
-                <a16:creationId xmlns:a16="http://schemas.microsoft.com/office/drawing/2014/main" id="{01735A2B-EA96-499A-5641-CA66B5EC9038}"/>
-              </a:ext>
-            </a:extLst>
-          </p:cNvPr>
-          <p:cNvPicPr>
-            <a:picLocks noChangeAspect="1"/>
-          </p:cNvPicPr>
-          <p:nvPr/>
-        </p:nvPicPr>
-        <p:blipFill>
-          <a:blip r:embed="rId4"/>
-          <a:stretch>
-            <a:fillRect/>
-          </a:stretch>
-        </p:blipFill>
-        <p:spPr>
-          <a:xfrm>
-            <a:off x="8097468" y="2000393"/>
-            <a:ext cx="3600000" cy="2443279"/>
-          </a:xfrm>
-          <a:prstGeom prst="rect">
-            <a:avLst/>
-          </a:prstGeom>
-        </p:spPr>
-      </p:pic>
       <p:cxnSp>
         <p:nvCxnSpPr>
           <p:cNvPr id="56" name="Straight Arrow Connector 55">
@@ -10463,6 +10487,66 @@
           </a:p>
         </p:txBody>
       </p:sp>
+      <p:pic>
+        <p:nvPicPr>
+          <p:cNvPr id="26" name="Picture 25">
+            <a:extLst>
+              <a:ext uri="{FF2B5EF4-FFF2-40B4-BE49-F238E27FC236}">
+                <a16:creationId xmlns:a16="http://schemas.microsoft.com/office/drawing/2014/main" id="{8B6B6A89-C9B5-3A63-EF29-11E9B4E68536}"/>
+              </a:ext>
+            </a:extLst>
+          </p:cNvPr>
+          <p:cNvPicPr>
+            <a:picLocks noChangeAspect="1"/>
+          </p:cNvPicPr>
+          <p:nvPr/>
+        </p:nvPicPr>
+        <p:blipFill>
+          <a:blip r:embed="rId3"/>
+          <a:stretch>
+            <a:fillRect/>
+          </a:stretch>
+        </p:blipFill>
+        <p:spPr>
+          <a:xfrm>
+            <a:off x="4276643" y="2022697"/>
+            <a:ext cx="3600000" cy="2396141"/>
+          </a:xfrm>
+          <a:prstGeom prst="rect">
+            <a:avLst/>
+          </a:prstGeom>
+        </p:spPr>
+      </p:pic>
+      <p:pic>
+        <p:nvPicPr>
+          <p:cNvPr id="51" name="Picture 50">
+            <a:extLst>
+              <a:ext uri="{FF2B5EF4-FFF2-40B4-BE49-F238E27FC236}">
+                <a16:creationId xmlns:a16="http://schemas.microsoft.com/office/drawing/2014/main" id="{D60B9107-D35C-E11D-DA1C-56447546663D}"/>
+              </a:ext>
+            </a:extLst>
+          </p:cNvPr>
+          <p:cNvPicPr>
+            <a:picLocks noChangeAspect="1"/>
+          </p:cNvPicPr>
+          <p:nvPr/>
+        </p:nvPicPr>
+        <p:blipFill>
+          <a:blip r:embed="rId4"/>
+          <a:stretch>
+            <a:fillRect/>
+          </a:stretch>
+        </p:blipFill>
+        <p:spPr>
+          <a:xfrm>
+            <a:off x="8097468" y="1993984"/>
+            <a:ext cx="3594758" cy="2439721"/>
+          </a:xfrm>
+          <a:prstGeom prst="rect">
+            <a:avLst/>
+          </a:prstGeom>
+        </p:spPr>
+      </p:pic>
     </p:spTree>
     <p:extLst>
       <p:ext uri="{BB962C8B-B14F-4D97-AF65-F5344CB8AC3E}">
@@ -10476,7 +10560,7 @@
 </p:sld>
 </file>
 
-<file path=ppt/slides/slide6.xml><?xml version="1.0" encoding="utf-8"?>
+<file path=ppt/slides/slide7.xml><?xml version="1.0" encoding="utf-8"?>
 <p:sld xmlns:a="http://schemas.openxmlformats.org/drawingml/2006/main" xmlns:r="http://schemas.openxmlformats.org/officeDocument/2006/relationships" xmlns:p="http://schemas.openxmlformats.org/presentationml/2006/main">
   <p:cSld>
     <p:spTree>
@@ -10495,10 +10579,10 @@
       </p:grpSpPr>
       <p:pic>
         <p:nvPicPr>
-          <p:cNvPr id="18" name="Picture 17">
-            <a:extLst>
-              <a:ext uri="{FF2B5EF4-FFF2-40B4-BE49-F238E27FC236}">
-                <a16:creationId xmlns:a16="http://schemas.microsoft.com/office/drawing/2014/main" id="{FC4CDD37-9EC6-E694-BF89-9EB379362CBE}"/>
+          <p:cNvPr id="9" name="Picture 8">
+            <a:extLst>
+              <a:ext uri="{FF2B5EF4-FFF2-40B4-BE49-F238E27FC236}">
+                <a16:creationId xmlns:a16="http://schemas.microsoft.com/office/drawing/2014/main" id="{AAC955B8-3A40-5048-F14A-44039849B1B3}"/>
               </a:ext>
             </a:extLst>
           </p:cNvPr>

</xml_diff>